<commit_message>
Add flow template, change Presentation class attributes.
</commit_message>
<xml_diff>
--- a/make_presentation/templates/templates/flow/_6.pptx
+++ b/make_presentation/templates/templates/flow/_6.pptx
@@ -8,7 +8,7 @@
     <p:notesMasterId r:id="rId8"/>
   </p:notesMasterIdLst>
   <p:sldIdLst>
-    <p:sldId id="263" r:id="rId2"/>
+    <p:sldId id="279" r:id="rId2"/>
     <p:sldId id="264" r:id="rId3"/>
     <p:sldId id="258" r:id="rId4"/>
     <p:sldId id="265" r:id="rId5"/>
@@ -202,7 +202,7 @@
           <a:p>
             <a:fld id="{EE3B10C3-A7B0-491D-A9C6-63E5AE6B014B}" type="datetimeFigureOut">
               <a:rPr lang="ru-RU" smtClean="0"/>
-              <a:t>01.10.2024</a:t>
+              <a:t>03.10.2024</a:t>
             </a:fld>
             <a:endParaRPr lang="ru-RU"/>
           </a:p>
@@ -768,7 +768,7 @@
           <a:p>
             <a:fld id="{C764DE79-268F-4C1A-8933-263129D2AF90}" type="datetimeFigureOut">
               <a:rPr lang="en-US" dirty="0"/>
-              <a:t>10/1/2024</a:t>
+              <a:t>10/3/2024</a:t>
             </a:fld>
             <a:endParaRPr lang="en-US" dirty="0"/>
           </a:p>
@@ -938,7 +938,7 @@
           <a:p>
             <a:fld id="{C764DE79-268F-4C1A-8933-263129D2AF90}" type="datetimeFigureOut">
               <a:rPr lang="en-US" dirty="0"/>
-              <a:t>10/1/2024</a:t>
+              <a:t>10/3/2024</a:t>
             </a:fld>
             <a:endParaRPr lang="en-US" dirty="0"/>
           </a:p>
@@ -1118,7 +1118,7 @@
           <a:p>
             <a:fld id="{C764DE79-268F-4C1A-8933-263129D2AF90}" type="datetimeFigureOut">
               <a:rPr lang="en-US" dirty="0"/>
-              <a:t>10/1/2024</a:t>
+              <a:t>10/3/2024</a:t>
             </a:fld>
             <a:endParaRPr lang="en-US" dirty="0"/>
           </a:p>
@@ -1288,7 +1288,7 @@
           <a:p>
             <a:fld id="{C764DE79-268F-4C1A-8933-263129D2AF90}" type="datetimeFigureOut">
               <a:rPr lang="en-US" dirty="0"/>
-              <a:t>10/1/2024</a:t>
+              <a:t>10/3/2024</a:t>
             </a:fld>
             <a:endParaRPr lang="en-US" dirty="0"/>
           </a:p>
@@ -1534,7 +1534,7 @@
           <a:p>
             <a:fld id="{C764DE79-268F-4C1A-8933-263129D2AF90}" type="datetimeFigureOut">
               <a:rPr lang="en-US" dirty="0"/>
-              <a:t>10/1/2024</a:t>
+              <a:t>10/3/2024</a:t>
             </a:fld>
             <a:endParaRPr lang="en-US" dirty="0"/>
           </a:p>
@@ -1766,7 +1766,7 @@
           <a:p>
             <a:fld id="{C764DE79-268F-4C1A-8933-263129D2AF90}" type="datetimeFigureOut">
               <a:rPr lang="en-US" dirty="0"/>
-              <a:t>10/1/2024</a:t>
+              <a:t>10/3/2024</a:t>
             </a:fld>
             <a:endParaRPr lang="en-US" dirty="0"/>
           </a:p>
@@ -2133,7 +2133,7 @@
           <a:p>
             <a:fld id="{C764DE79-268F-4C1A-8933-263129D2AF90}" type="datetimeFigureOut">
               <a:rPr lang="en-US" dirty="0"/>
-              <a:t>10/1/2024</a:t>
+              <a:t>10/3/2024</a:t>
             </a:fld>
             <a:endParaRPr lang="en-US" dirty="0"/>
           </a:p>
@@ -2251,7 +2251,7 @@
           <a:p>
             <a:fld id="{C764DE79-268F-4C1A-8933-263129D2AF90}" type="datetimeFigureOut">
               <a:rPr lang="en-US" dirty="0"/>
-              <a:t>10/1/2024</a:t>
+              <a:t>10/3/2024</a:t>
             </a:fld>
             <a:endParaRPr lang="en-US" dirty="0"/>
           </a:p>
@@ -2346,7 +2346,7 @@
           <a:p>
             <a:fld id="{C764DE79-268F-4C1A-8933-263129D2AF90}" type="datetimeFigureOut">
               <a:rPr lang="en-US" dirty="0"/>
-              <a:t>10/1/2024</a:t>
+              <a:t>10/3/2024</a:t>
             </a:fld>
             <a:endParaRPr lang="en-US" dirty="0"/>
           </a:p>
@@ -2623,7 +2623,7 @@
           <a:p>
             <a:fld id="{C764DE79-268F-4C1A-8933-263129D2AF90}" type="datetimeFigureOut">
               <a:rPr lang="en-US" dirty="0"/>
-              <a:t>10/1/2024</a:t>
+              <a:t>10/3/2024</a:t>
             </a:fld>
             <a:endParaRPr lang="en-US" dirty="0"/>
           </a:p>
@@ -2880,7 +2880,7 @@
           <a:p>
             <a:fld id="{C764DE79-268F-4C1A-8933-263129D2AF90}" type="datetimeFigureOut">
               <a:rPr lang="en-US" dirty="0"/>
-              <a:t>10/1/2024</a:t>
+              <a:t>10/3/2024</a:t>
             </a:fld>
             <a:endParaRPr lang="en-US" dirty="0"/>
           </a:p>
@@ -3098,7 +3098,7 @@
           <a:p>
             <a:fld id="{C764DE79-268F-4C1A-8933-263129D2AF90}" type="datetimeFigureOut">
               <a:rPr lang="en-US" dirty="0"/>
-              <a:t>10/1/2024</a:t>
+              <a:t>10/3/2024</a:t>
             </a:fld>
             <a:endParaRPr lang="en-US" dirty="0"/>
           </a:p>
@@ -3491,15 +3491,9 @@
   <p:cSld>
     <p:bg>
       <p:bgPr>
-        <a:blipFill dpi="0" rotWithShape="1">
-          <a:blip r:embed="rId2">
-            <a:lum/>
-          </a:blip>
-          <a:srcRect/>
-          <a:stretch>
-            <a:fillRect/>
-          </a:stretch>
-        </a:blipFill>
+        <a:solidFill>
+          <a:srgbClr val="A0A585"/>
+        </a:solidFill>
         <a:effectLst/>
       </p:bgPr>
     </p:bg>
@@ -3540,9 +3534,7 @@
             </a:avLst>
           </a:prstGeom>
           <a:solidFill>
-            <a:schemeClr val="bg1">
-              <a:lumMod val="85000"/>
-            </a:schemeClr>
+            <a:schemeClr val="tx1"/>
           </a:solidFill>
           <a:ln>
             <a:noFill/>
@@ -3574,189 +3566,12 @@
               </a:lnSpc>
               <a:buNone/>
             </a:pPr>
-            <a:r>
-              <a:rPr lang="en-US" sz="1800" b="0" strike="noStrike" spc="-1" dirty="0">
-                <a:solidFill>
-                  <a:srgbClr val="000000"/>
-                </a:solidFill>
-                <a:latin typeface="Calibri"/>
-                <a:ea typeface="DejaVu Sans"/>
-              </a:rPr>
-              <a:t>PIC</a:t>
-            </a:r>
             <a:endParaRPr lang="en-US" sz="1800" b="0" strike="noStrike" spc="-1" dirty="0">
               <a:latin typeface="Arial"/>
             </a:endParaRPr>
           </a:p>
         </p:txBody>
       </p:sp>
-      <p:sp>
-        <p:nvSpPr>
-          <p:cNvPr id="12" name="Прямоугольник со скругленными углами 3">
-            <a:extLst>
-              <a:ext uri="{FF2B5EF4-FFF2-40B4-BE49-F238E27FC236}">
-                <a16:creationId xmlns:a16="http://schemas.microsoft.com/office/drawing/2014/main" id="{37D9A3FD-E039-4841-AD8B-AC770735E759}"/>
-              </a:ext>
-            </a:extLst>
-          </p:cNvPr>
-          <p:cNvSpPr/>
-          <p:nvPr/>
-        </p:nvSpPr>
-        <p:spPr>
-          <a:xfrm>
-            <a:off x="186690" y="185301"/>
-            <a:ext cx="8770620" cy="4758610"/>
-          </a:xfrm>
-          <a:prstGeom prst="roundRect">
-            <a:avLst>
-              <a:gd name="adj" fmla="val 4051"/>
-            </a:avLst>
-          </a:prstGeom>
-          <a:solidFill>
-            <a:srgbClr val="000000">
-              <a:alpha val="34902"/>
-            </a:srgbClr>
-          </a:solidFill>
-          <a:ln>
-            <a:noFill/>
-          </a:ln>
-        </p:spPr>
-        <p:style>
-          <a:lnRef idx="2">
-            <a:schemeClr val="accent1">
-              <a:shade val="50000"/>
-            </a:schemeClr>
-          </a:lnRef>
-          <a:fillRef idx="1">
-            <a:schemeClr val="accent1"/>
-          </a:fillRef>
-          <a:effectRef idx="0">
-            <a:schemeClr val="accent1"/>
-          </a:effectRef>
-          <a:fontRef idx="minor"/>
-        </p:style>
-        <p:txBody>
-          <a:bodyPr lIns="90000" tIns="45000" rIns="90000" bIns="45000" anchor="ctr">
-            <a:noAutofit/>
-          </a:bodyPr>
-          <a:lstStyle/>
-          <a:p>
-            <a:pPr algn="ctr">
-              <a:lnSpc>
-                <a:spcPct val="100000"/>
-              </a:lnSpc>
-              <a:buNone/>
-            </a:pPr>
-            <a:endParaRPr lang="en-US" sz="1800" b="0" strike="noStrike" spc="-1" dirty="0">
-              <a:latin typeface="Arial"/>
-            </a:endParaRPr>
-          </a:p>
-        </p:txBody>
-      </p:sp>
-      <p:sp>
-        <p:nvSpPr>
-          <p:cNvPr id="9" name="Прямоугольник 5">
-            <a:extLst>
-              <a:ext uri="{FF2B5EF4-FFF2-40B4-BE49-F238E27FC236}">
-                <a16:creationId xmlns:a16="http://schemas.microsoft.com/office/drawing/2014/main" id="{C7BF634F-01CF-44F1-A622-4D75EB569C2B}"/>
-              </a:ext>
-            </a:extLst>
-          </p:cNvPr>
-          <p:cNvSpPr>
-            <a:spLocks noChangeAspect="1"/>
-          </p:cNvSpPr>
-          <p:nvPr/>
-        </p:nvSpPr>
-        <p:spPr>
-          <a:xfrm>
-            <a:off x="460151" y="4588590"/>
-            <a:ext cx="2999374" cy="270030"/>
-          </a:xfrm>
-          <a:prstGeom prst="rect">
-            <a:avLst/>
-          </a:prstGeom>
-        </p:spPr>
-        <p:txBody>
-          <a:bodyPr wrap="square">
-            <a:noAutofit/>
-          </a:bodyPr>
-          <a:lstStyle/>
-          <a:p>
-            <a:pPr>
-              <a:lnSpc>
-                <a:spcPts val="1650"/>
-              </a:lnSpc>
-            </a:pPr>
-            <a:r>
-              <a:rPr lang="ru-RU" sz="900" dirty="0">
-                <a:solidFill>
-                  <a:schemeClr val="bg1">
-                    <a:lumMod val="95000"/>
-                  </a:schemeClr>
-                </a:solidFill>
-                <a:latin typeface="Arial" panose="020B0604020202020204" pitchFamily="34" charset="0"/>
-              </a:rPr>
-              <a:t>Презентация создана в </a:t>
-            </a:r>
-            <a:r>
-              <a:rPr lang="en-US" sz="900" dirty="0">
-                <a:solidFill>
-                  <a:schemeClr val="bg1">
-                    <a:lumMod val="95000"/>
-                  </a:schemeClr>
-                </a:solidFill>
-                <a:latin typeface="Arial" panose="020B0604020202020204" pitchFamily="34" charset="0"/>
-              </a:rPr>
-              <a:t>Fibonacci</a:t>
-            </a:r>
-            <a:endParaRPr lang="en-US" altLang="ru-RU" sz="900" dirty="0">
-              <a:solidFill>
-                <a:schemeClr val="bg1">
-                  <a:lumMod val="95000"/>
-                </a:schemeClr>
-              </a:solidFill>
-              <a:latin typeface="Arial" panose="020B0604020202020204" pitchFamily="34" charset="0"/>
-              <a:cs typeface="Arial" panose="020B0604020202020204" pitchFamily="34" charset="0"/>
-            </a:endParaRPr>
-          </a:p>
-        </p:txBody>
-      </p:sp>
-      <p:pic>
-        <p:nvPicPr>
-          <p:cNvPr id="6" name="Рисунок 5">
-            <a:extLst>
-              <a:ext uri="{FF2B5EF4-FFF2-40B4-BE49-F238E27FC236}">
-                <a16:creationId xmlns:a16="http://schemas.microsoft.com/office/drawing/2014/main" id="{B9DE915D-CE18-4AE1-80C7-A3F161B8808B}"/>
-              </a:ext>
-            </a:extLst>
-          </p:cNvPr>
-          <p:cNvPicPr>
-            <a:picLocks noChangeAspect="1"/>
-          </p:cNvPicPr>
-          <p:nvPr/>
-        </p:nvPicPr>
-        <p:blipFill>
-          <a:blip r:embed="rId3">
-            <a:extLst>
-              <a:ext uri="{28A0092B-C50C-407E-A947-70E740481C1C}">
-                <a14:useLocalDpi xmlns:a14="http://schemas.microsoft.com/office/drawing/2010/main" val="0"/>
-              </a:ext>
-            </a:extLst>
-          </a:blip>
-          <a:stretch>
-            <a:fillRect/>
-          </a:stretch>
-        </p:blipFill>
-        <p:spPr>
-          <a:xfrm>
-            <a:off x="2423227" y="4589278"/>
-            <a:ext cx="291491" cy="291491"/>
-          </a:xfrm>
-          <a:prstGeom prst="rect">
-            <a:avLst/>
-          </a:prstGeom>
-        </p:spPr>
-      </p:pic>
       <p:sp>
         <p:nvSpPr>
           <p:cNvPr id="10" name="Прямоугольник 10">
@@ -3826,10 +3641,10 @@
       </p:sp>
       <p:sp>
         <p:nvSpPr>
-          <p:cNvPr id="5" name="Прямоугольник 5">
+          <p:cNvPr id="9" name="Прямоугольник 5">
             <a:extLst>
               <a:ext uri="{FF2B5EF4-FFF2-40B4-BE49-F238E27FC236}">
-                <a16:creationId xmlns:a16="http://schemas.microsoft.com/office/drawing/2014/main" id="{1B39D161-696F-4E15-BB81-EDC3DFF4015B}"/>
+                <a16:creationId xmlns:a16="http://schemas.microsoft.com/office/drawing/2014/main" id="{AADE1553-B55B-4B19-934A-A96E25126C3C}"/>
               </a:ext>
             </a:extLst>
           </p:cNvPr>
@@ -3840,7 +3655,111 @@
         </p:nvSpPr>
         <p:spPr>
           <a:xfrm>
-            <a:off x="460151" y="351879"/>
+            <a:off x="460151" y="4595734"/>
+            <a:ext cx="2999374" cy="270030"/>
+          </a:xfrm>
+          <a:prstGeom prst="rect">
+            <a:avLst/>
+          </a:prstGeom>
+        </p:spPr>
+        <p:txBody>
+          <a:bodyPr wrap="square">
+            <a:noAutofit/>
+          </a:bodyPr>
+          <a:lstStyle/>
+          <a:p>
+            <a:pPr>
+              <a:lnSpc>
+                <a:spcPts val="1650"/>
+              </a:lnSpc>
+            </a:pPr>
+            <a:r>
+              <a:rPr lang="ru-RU" sz="900" dirty="0">
+                <a:solidFill>
+                  <a:schemeClr val="bg1">
+                    <a:lumMod val="95000"/>
+                  </a:schemeClr>
+                </a:solidFill>
+                <a:latin typeface="Arial" panose="020B0604020202020204" pitchFamily="34" charset="0"/>
+              </a:rPr>
+              <a:t>Презентация создана в </a:t>
+            </a:r>
+            <a:r>
+              <a:rPr lang="en-US" sz="900" dirty="0">
+                <a:solidFill>
+                  <a:schemeClr val="bg1">
+                    <a:lumMod val="95000"/>
+                  </a:schemeClr>
+                </a:solidFill>
+                <a:latin typeface="Arial" panose="020B0604020202020204" pitchFamily="34" charset="0"/>
+              </a:rPr>
+              <a:t>Fibonacci</a:t>
+            </a:r>
+            <a:endParaRPr lang="en-US" altLang="ru-RU" sz="900" dirty="0">
+              <a:solidFill>
+                <a:schemeClr val="bg1">
+                  <a:lumMod val="95000"/>
+                </a:schemeClr>
+              </a:solidFill>
+              <a:latin typeface="Arial" panose="020B0604020202020204" pitchFamily="34" charset="0"/>
+              <a:cs typeface="Arial" panose="020B0604020202020204" pitchFamily="34" charset="0"/>
+            </a:endParaRPr>
+          </a:p>
+        </p:txBody>
+      </p:sp>
+      <p:pic>
+        <p:nvPicPr>
+          <p:cNvPr id="12" name="Рисунок 11">
+            <a:extLst>
+              <a:ext uri="{FF2B5EF4-FFF2-40B4-BE49-F238E27FC236}">
+                <a16:creationId xmlns:a16="http://schemas.microsoft.com/office/drawing/2014/main" id="{3EE06FEA-8EF8-473F-8ADE-364D5FADA88C}"/>
+              </a:ext>
+            </a:extLst>
+          </p:cNvPr>
+          <p:cNvPicPr>
+            <a:picLocks noChangeAspect="1"/>
+          </p:cNvPicPr>
+          <p:nvPr/>
+        </p:nvPicPr>
+        <p:blipFill>
+          <a:blip r:embed="rId2">
+            <a:extLst>
+              <a:ext uri="{28A0092B-C50C-407E-A947-70E740481C1C}">
+                <a14:useLocalDpi xmlns:a14="http://schemas.microsoft.com/office/drawing/2010/main" val="0"/>
+              </a:ext>
+            </a:extLst>
+          </a:blip>
+          <a:stretch>
+            <a:fillRect/>
+          </a:stretch>
+        </p:blipFill>
+        <p:spPr>
+          <a:xfrm>
+            <a:off x="2423227" y="4596422"/>
+            <a:ext cx="291491" cy="291491"/>
+          </a:xfrm>
+          <a:prstGeom prst="rect">
+            <a:avLst/>
+          </a:prstGeom>
+        </p:spPr>
+      </p:pic>
+      <p:sp>
+        <p:nvSpPr>
+          <p:cNvPr id="15" name="Прямоугольник 5">
+            <a:extLst>
+              <a:ext uri="{FF2B5EF4-FFF2-40B4-BE49-F238E27FC236}">
+                <a16:creationId xmlns:a16="http://schemas.microsoft.com/office/drawing/2014/main" id="{06A005B8-DF65-4B73-8E31-DC69B8EB0F73}"/>
+              </a:ext>
+            </a:extLst>
+          </p:cNvPr>
+          <p:cNvSpPr>
+            <a:spLocks noChangeAspect="1"/>
+          </p:cNvSpPr>
+          <p:nvPr/>
+        </p:nvSpPr>
+        <p:spPr>
+          <a:xfrm>
+            <a:off x="460151" y="359023"/>
             <a:ext cx="2999374" cy="270030"/>
           </a:xfrm>
           <a:prstGeom prst="rect">
@@ -3884,7 +3803,7 @@
     </p:spTree>
     <p:extLst>
       <p:ext uri="{BB962C8B-B14F-4D97-AF65-F5344CB8AC3E}">
-        <p14:creationId xmlns:p14="http://schemas.microsoft.com/office/powerpoint/2010/main" val="1235132550"/>
+        <p14:creationId xmlns:p14="http://schemas.microsoft.com/office/powerpoint/2010/main" val="867889840"/>
       </p:ext>
     </p:extLst>
   </p:cSld>
@@ -3924,66 +3843,6 @@
       </p:grpSpPr>
       <p:sp>
         <p:nvSpPr>
-          <p:cNvPr id="7" name="TextBox 6">
-            <a:extLst>
-              <a:ext uri="{FF2B5EF4-FFF2-40B4-BE49-F238E27FC236}">
-                <a16:creationId xmlns:a16="http://schemas.microsoft.com/office/drawing/2014/main" id="{8167D7AF-1912-4030-BF52-4A523E802088}"/>
-              </a:ext>
-            </a:extLst>
-          </p:cNvPr>
-          <p:cNvSpPr txBox="1"/>
-          <p:nvPr/>
-        </p:nvSpPr>
-        <p:spPr>
-          <a:xfrm>
-            <a:off x="384927" y="233218"/>
-            <a:ext cx="2986923" cy="1893299"/>
-          </a:xfrm>
-          <a:prstGeom prst="rect">
-            <a:avLst/>
-          </a:prstGeom>
-          <a:noFill/>
-          <a:ln w="0">
-            <a:noFill/>
-          </a:ln>
-        </p:spPr>
-        <p:txBody>
-          <a:bodyPr lIns="90000" tIns="45000" rIns="90000" bIns="45000" anchor="t">
-            <a:noAutofit/>
-          </a:bodyPr>
-          <a:lstStyle/>
-          <a:p>
-            <a:r>
-              <a:rPr lang="en-US" sz="2800" b="1" strike="noStrike" spc="-1" dirty="0">
-                <a:solidFill>
-                  <a:schemeClr val="bg1"/>
-                </a:solidFill>
-                <a:latin typeface="Arial" panose="020B0604020202020204" pitchFamily="34" charset="0"/>
-                <a:cs typeface="Arial" panose="020B0604020202020204" pitchFamily="34" charset="0"/>
-              </a:rPr>
-              <a:t>TITLE</a:t>
-            </a:r>
-            <a:endParaRPr lang="ru-RU" sz="2800" b="1" strike="noStrike" spc="-1" dirty="0">
-              <a:solidFill>
-                <a:schemeClr val="bg1"/>
-              </a:solidFill>
-              <a:latin typeface="Arial" panose="020B0604020202020204" pitchFamily="34" charset="0"/>
-              <a:cs typeface="Arial" panose="020B0604020202020204" pitchFamily="34" charset="0"/>
-            </a:endParaRPr>
-          </a:p>
-          <a:p>
-            <a:endParaRPr lang="ru-RU" sz="2800" b="1" strike="noStrike" spc="-1" dirty="0">
-              <a:solidFill>
-                <a:schemeClr val="bg1"/>
-              </a:solidFill>
-              <a:latin typeface="Arial Black" panose="020B0A04020102020204" pitchFamily="34" charset="0"/>
-              <a:cs typeface="Arial" panose="020B0604020202020204" pitchFamily="34" charset="0"/>
-            </a:endParaRPr>
-          </a:p>
-        </p:txBody>
-      </p:sp>
-      <p:sp>
-        <p:nvSpPr>
           <p:cNvPr id="11" name="Прямоугольник со скругленными углами 3">
             <a:extLst>
               <a:ext uri="{FF2B5EF4-FFF2-40B4-BE49-F238E27FC236}">
@@ -4005,9 +3864,7 @@
             </a:avLst>
           </a:prstGeom>
           <a:solidFill>
-            <a:schemeClr val="bg1">
-              <a:lumMod val="85000"/>
-            </a:schemeClr>
+            <a:srgbClr val="A0A585"/>
           </a:solidFill>
           <a:ln>
             <a:noFill/>
@@ -4069,8 +3926,8 @@
         </p:nvSpPr>
         <p:spPr>
           <a:xfrm>
-            <a:off x="3984786" y="492919"/>
-            <a:ext cx="4676096" cy="4157662"/>
+            <a:off x="3721894" y="257176"/>
+            <a:ext cx="5186362" cy="4650580"/>
           </a:xfrm>
           <a:prstGeom prst="roundRect">
             <a:avLst>
@@ -4108,7 +3965,7 @@
           <a:lstStyle/>
           <a:p>
             <a:pPr algn="ctr"/>
-            <a:endParaRPr lang="ru-RU"/>
+            <a:endParaRPr lang="ru-RU" dirty="0"/>
           </a:p>
         </p:txBody>
       </p:sp>
@@ -4126,7 +3983,7 @@
         </p:nvSpPr>
         <p:spPr>
           <a:xfrm>
-            <a:off x="4331832" y="802496"/>
+            <a:off x="4121944" y="631046"/>
             <a:ext cx="900112" cy="900112"/>
           </a:xfrm>
           <a:prstGeom prst="ellipse">
@@ -4181,8 +4038,8 @@
         </p:nvSpPr>
         <p:spPr>
           <a:xfrm>
-            <a:off x="4331832" y="2121694"/>
-            <a:ext cx="900112" cy="900112"/>
+            <a:off x="4121944" y="2127661"/>
+            <a:ext cx="900112" cy="888177"/>
           </a:xfrm>
           <a:prstGeom prst="ellipse">
             <a:avLst/>
@@ -4236,7 +4093,7 @@
         </p:nvSpPr>
         <p:spPr>
           <a:xfrm>
-            <a:off x="4331832" y="3440892"/>
+            <a:off x="4121944" y="3612342"/>
             <a:ext cx="900112" cy="900112"/>
           </a:xfrm>
           <a:prstGeom prst="ellipse">
@@ -4291,8 +4148,8 @@
         </p:nvSpPr>
         <p:spPr>
           <a:xfrm>
-            <a:off x="5317943" y="644272"/>
-            <a:ext cx="3220068" cy="551124"/>
+            <a:off x="5110773" y="489699"/>
+            <a:ext cx="3579637" cy="551124"/>
           </a:xfrm>
           <a:prstGeom prst="rect">
             <a:avLst/>
@@ -4329,7 +4186,9 @@
             <a:r>
               <a:rPr lang="en-US" sz="1400" strike="noStrike" spc="-1" dirty="0">
                 <a:solidFill>
-                  <a:schemeClr val="bg1"/>
+                  <a:schemeClr val="bg1">
+                    <a:lumMod val="85000"/>
+                  </a:schemeClr>
                 </a:solidFill>
                 <a:latin typeface="Arial" panose="020B0604020202020204" pitchFamily="34" charset="0"/>
                 <a:ea typeface="DejaVu Sans"/>
@@ -4340,7 +4199,9 @@
             <a:r>
               <a:rPr lang="ru-RU" sz="1400" strike="noStrike" spc="-1" dirty="0">
                 <a:solidFill>
-                  <a:schemeClr val="bg1"/>
+                  <a:schemeClr val="bg1">
+                    <a:lumMod val="85000"/>
+                  </a:schemeClr>
                 </a:solidFill>
                 <a:latin typeface="Arial" panose="020B0604020202020204" pitchFamily="34" charset="0"/>
                 <a:ea typeface="DejaVu Sans"/>
@@ -4350,7 +4211,9 @@
             </a:r>
             <a:endParaRPr lang="en-US" sz="1400" strike="noStrike" spc="-1" dirty="0">
               <a:solidFill>
-                <a:schemeClr val="bg1"/>
+                <a:schemeClr val="bg1">
+                  <a:lumMod val="85000"/>
+                </a:schemeClr>
               </a:solidFill>
               <a:latin typeface="Arial" panose="020B0604020202020204" pitchFamily="34" charset="0"/>
               <a:cs typeface="Arial" panose="020B0604020202020204" pitchFamily="34" charset="0"/>
@@ -4372,8 +4235,8 @@
         </p:nvSpPr>
         <p:spPr>
           <a:xfrm>
-            <a:off x="5317943" y="1179958"/>
-            <a:ext cx="3220068" cy="790086"/>
+            <a:off x="5110773" y="1025385"/>
+            <a:ext cx="3579637" cy="790086"/>
           </a:xfrm>
           <a:prstGeom prst="rect">
             <a:avLst/>
@@ -4453,8 +4316,8 @@
         </p:nvSpPr>
         <p:spPr>
           <a:xfrm>
-            <a:off x="5314332" y="1970044"/>
-            <a:ext cx="3220068" cy="551124"/>
+            <a:off x="5107162" y="1985286"/>
+            <a:ext cx="3579637" cy="551124"/>
           </a:xfrm>
           <a:prstGeom prst="rect">
             <a:avLst/>
@@ -4491,7 +4354,9 @@
             <a:r>
               <a:rPr lang="en-US" sz="1400" strike="noStrike" spc="-1" dirty="0">
                 <a:solidFill>
-                  <a:schemeClr val="bg1"/>
+                  <a:schemeClr val="bg1">
+                    <a:lumMod val="85000"/>
+                  </a:schemeClr>
                 </a:solidFill>
                 <a:latin typeface="Arial" panose="020B0604020202020204" pitchFamily="34" charset="0"/>
                 <a:ea typeface="DejaVu Sans"/>
@@ -4501,7 +4366,9 @@
             </a:r>
             <a:endParaRPr lang="en-US" sz="1400" strike="noStrike" spc="-1" dirty="0">
               <a:solidFill>
-                <a:schemeClr val="bg1"/>
+                <a:schemeClr val="bg1">
+                  <a:lumMod val="85000"/>
+                </a:schemeClr>
               </a:solidFill>
               <a:latin typeface="Arial" panose="020B0604020202020204" pitchFamily="34" charset="0"/>
               <a:cs typeface="Arial" panose="020B0604020202020204" pitchFamily="34" charset="0"/>
@@ -4523,8 +4390,8 @@
         </p:nvSpPr>
         <p:spPr>
           <a:xfrm>
-            <a:off x="5314332" y="2502715"/>
-            <a:ext cx="3220068" cy="843683"/>
+            <a:off x="5107162" y="2517957"/>
+            <a:ext cx="3579637" cy="843683"/>
           </a:xfrm>
           <a:prstGeom prst="rect">
             <a:avLst/>
@@ -4604,8 +4471,8 @@
         </p:nvSpPr>
         <p:spPr>
           <a:xfrm>
-            <a:off x="5314332" y="3297919"/>
-            <a:ext cx="3220068" cy="551124"/>
+            <a:off x="5107162" y="3470760"/>
+            <a:ext cx="3579637" cy="551124"/>
           </a:xfrm>
           <a:prstGeom prst="rect">
             <a:avLst/>
@@ -4642,7 +4509,9 @@
             <a:r>
               <a:rPr lang="en-US" sz="1400" strike="noStrike" spc="-1" dirty="0">
                 <a:solidFill>
-                  <a:schemeClr val="bg1"/>
+                  <a:schemeClr val="bg1">
+                    <a:lumMod val="85000"/>
+                  </a:schemeClr>
                 </a:solidFill>
                 <a:latin typeface="Arial" panose="020B0604020202020204" pitchFamily="34" charset="0"/>
                 <a:ea typeface="DejaVu Sans"/>
@@ -4652,7 +4521,9 @@
             </a:r>
             <a:endParaRPr lang="en-US" sz="1400" strike="noStrike" spc="-1" dirty="0">
               <a:solidFill>
-                <a:schemeClr val="bg1"/>
+                <a:schemeClr val="bg1">
+                  <a:lumMod val="85000"/>
+                </a:schemeClr>
               </a:solidFill>
               <a:latin typeface="Arial" panose="020B0604020202020204" pitchFamily="34" charset="0"/>
               <a:cs typeface="Arial" panose="020B0604020202020204" pitchFamily="34" charset="0"/>
@@ -4674,8 +4545,8 @@
         </p:nvSpPr>
         <p:spPr>
           <a:xfrm>
-            <a:off x="5314332" y="3830590"/>
-            <a:ext cx="3220068" cy="795204"/>
+            <a:off x="5107162" y="4003431"/>
+            <a:ext cx="3579637" cy="795204"/>
           </a:xfrm>
           <a:prstGeom prst="rect">
             <a:avLst/>
@@ -4732,6 +4603,57 @@
               <a:t>3</a:t>
             </a:r>
             <a:endParaRPr lang="en-US" sz="1100" b="0" strike="noStrike" spc="-1" dirty="0">
+              <a:solidFill>
+                <a:schemeClr val="bg1"/>
+              </a:solidFill>
+              <a:latin typeface="Arial" panose="020B0604020202020204" pitchFamily="34" charset="0"/>
+              <a:cs typeface="Arial" panose="020B0604020202020204" pitchFamily="34" charset="0"/>
+            </a:endParaRPr>
+          </a:p>
+        </p:txBody>
+      </p:sp>
+      <p:sp>
+        <p:nvSpPr>
+          <p:cNvPr id="14" name="TextBox 13">
+            <a:extLst>
+              <a:ext uri="{FF2B5EF4-FFF2-40B4-BE49-F238E27FC236}">
+                <a16:creationId xmlns:a16="http://schemas.microsoft.com/office/drawing/2014/main" id="{274A8B32-9D6B-484F-8879-DE4E765CC8E7}"/>
+              </a:ext>
+            </a:extLst>
+          </p:cNvPr>
+          <p:cNvSpPr txBox="1"/>
+          <p:nvPr/>
+        </p:nvSpPr>
+        <p:spPr>
+          <a:xfrm>
+            <a:off x="166127" y="200808"/>
+            <a:ext cx="3148573" cy="1842305"/>
+          </a:xfrm>
+          <a:prstGeom prst="rect">
+            <a:avLst/>
+          </a:prstGeom>
+          <a:noFill/>
+          <a:ln w="0">
+            <a:noFill/>
+          </a:ln>
+        </p:spPr>
+        <p:txBody>
+          <a:bodyPr lIns="90000" tIns="45000" rIns="90000" bIns="45000" anchor="t">
+            <a:noAutofit/>
+          </a:bodyPr>
+          <a:lstStyle/>
+          <a:p>
+            <a:r>
+              <a:rPr lang="en-US" sz="2200" strike="noStrike" spc="-1" dirty="0">
+                <a:solidFill>
+                  <a:schemeClr val="bg1"/>
+                </a:solidFill>
+                <a:latin typeface="Arial" panose="020B0604020202020204" pitchFamily="34" charset="0"/>
+                <a:cs typeface="Arial" panose="020B0604020202020204" pitchFamily="34" charset="0"/>
+              </a:rPr>
+              <a:t>TITLE</a:t>
+            </a:r>
+            <a:endParaRPr lang="ru-RU" sz="2200" strike="noStrike" spc="-1" dirty="0">
               <a:solidFill>
                 <a:schemeClr val="bg1"/>
               </a:solidFill>
@@ -4784,66 +4706,6 @@
       </p:grpSpPr>
       <p:sp>
         <p:nvSpPr>
-          <p:cNvPr id="21" name="TextBox 20">
-            <a:extLst>
-              <a:ext uri="{FF2B5EF4-FFF2-40B4-BE49-F238E27FC236}">
-                <a16:creationId xmlns:a16="http://schemas.microsoft.com/office/drawing/2014/main" id="{A9E08749-B336-405C-87F1-1309A67FA416}"/>
-              </a:ext>
-            </a:extLst>
-          </p:cNvPr>
-          <p:cNvSpPr txBox="1"/>
-          <p:nvPr/>
-        </p:nvSpPr>
-        <p:spPr>
-          <a:xfrm>
-            <a:off x="384926" y="2090575"/>
-            <a:ext cx="8466179" cy="481175"/>
-          </a:xfrm>
-          <a:prstGeom prst="rect">
-            <a:avLst/>
-          </a:prstGeom>
-          <a:noFill/>
-          <a:ln w="0">
-            <a:noFill/>
-          </a:ln>
-        </p:spPr>
-        <p:txBody>
-          <a:bodyPr lIns="90000" tIns="45000" rIns="90000" bIns="45000" anchor="t">
-            <a:noAutofit/>
-          </a:bodyPr>
-          <a:lstStyle/>
-          <a:p>
-            <a:r>
-              <a:rPr lang="en-US" sz="2200" strike="noStrike" spc="-1" dirty="0">
-                <a:solidFill>
-                  <a:schemeClr val="bg1"/>
-                </a:solidFill>
-                <a:latin typeface="Arial" panose="020B0604020202020204" pitchFamily="34" charset="0"/>
-                <a:cs typeface="Arial" panose="020B0604020202020204" pitchFamily="34" charset="0"/>
-              </a:rPr>
-              <a:t>TITLE</a:t>
-            </a:r>
-            <a:endParaRPr lang="ru-RU" sz="2200" strike="noStrike" spc="-1" dirty="0">
-              <a:solidFill>
-                <a:schemeClr val="bg1"/>
-              </a:solidFill>
-              <a:latin typeface="Arial" panose="020B0604020202020204" pitchFamily="34" charset="0"/>
-              <a:cs typeface="Arial" panose="020B0604020202020204" pitchFamily="34" charset="0"/>
-            </a:endParaRPr>
-          </a:p>
-          <a:p>
-            <a:endParaRPr lang="ru-RU" sz="2200" strike="noStrike" spc="-1" dirty="0">
-              <a:solidFill>
-                <a:schemeClr val="bg1"/>
-              </a:solidFill>
-              <a:latin typeface="Arial Black" panose="020B0A04020102020204" pitchFamily="34" charset="0"/>
-              <a:cs typeface="Arial" panose="020B0604020202020204" pitchFamily="34" charset="0"/>
-            </a:endParaRPr>
-          </a:p>
-        </p:txBody>
-      </p:sp>
-      <p:sp>
-        <p:nvSpPr>
           <p:cNvPr id="22" name="Прямоугольник со скругленными углами 3">
             <a:extLst>
               <a:ext uri="{FF2B5EF4-FFF2-40B4-BE49-F238E27FC236}">
@@ -5371,6 +5233,57 @@
               <a:t>3</a:t>
             </a:r>
             <a:endParaRPr lang="en-US" sz="1100" b="0" strike="noStrike" spc="-1" dirty="0">
+              <a:solidFill>
+                <a:schemeClr val="bg1"/>
+              </a:solidFill>
+              <a:latin typeface="Arial" panose="020B0604020202020204" pitchFamily="34" charset="0"/>
+              <a:cs typeface="Arial" panose="020B0604020202020204" pitchFamily="34" charset="0"/>
+            </a:endParaRPr>
+          </a:p>
+        </p:txBody>
+      </p:sp>
+      <p:sp>
+        <p:nvSpPr>
+          <p:cNvPr id="10" name="TextBox 9">
+            <a:extLst>
+              <a:ext uri="{FF2B5EF4-FFF2-40B4-BE49-F238E27FC236}">
+                <a16:creationId xmlns:a16="http://schemas.microsoft.com/office/drawing/2014/main" id="{02A8F858-9C18-4906-9472-ECA6C8947F80}"/>
+              </a:ext>
+            </a:extLst>
+          </p:cNvPr>
+          <p:cNvSpPr txBox="1"/>
+          <p:nvPr/>
+        </p:nvSpPr>
+        <p:spPr>
+          <a:xfrm>
+            <a:off x="384926" y="2177997"/>
+            <a:ext cx="8466179" cy="481175"/>
+          </a:xfrm>
+          <a:prstGeom prst="rect">
+            <a:avLst/>
+          </a:prstGeom>
+          <a:noFill/>
+          <a:ln w="0">
+            <a:noFill/>
+          </a:ln>
+        </p:spPr>
+        <p:txBody>
+          <a:bodyPr lIns="90000" tIns="45000" rIns="90000" bIns="45000" anchor="t">
+            <a:noAutofit/>
+          </a:bodyPr>
+          <a:lstStyle/>
+          <a:p>
+            <a:r>
+              <a:rPr lang="en-US" sz="2200" strike="noStrike" spc="-1" dirty="0">
+                <a:solidFill>
+                  <a:schemeClr val="bg1"/>
+                </a:solidFill>
+                <a:latin typeface="Arial" panose="020B0604020202020204" pitchFamily="34" charset="0"/>
+                <a:cs typeface="Arial" panose="020B0604020202020204" pitchFamily="34" charset="0"/>
+              </a:rPr>
+              <a:t>TITLE</a:t>
+            </a:r>
+            <a:endParaRPr lang="ru-RU" sz="2200" strike="noStrike" spc="-1" dirty="0">
               <a:solidFill>
                 <a:schemeClr val="bg1"/>
               </a:solidFill>
@@ -6097,7 +6010,7 @@
           <a:lstStyle/>
           <a:p>
             <a:r>
-              <a:rPr lang="en-US" sz="2800" b="1" strike="noStrike" spc="-1" dirty="0">
+              <a:rPr lang="en-US" sz="2200" strike="noStrike" spc="-1" dirty="0">
                 <a:solidFill>
                   <a:schemeClr val="bg1"/>
                 </a:solidFill>
@@ -6106,7 +6019,7 @@
               </a:rPr>
               <a:t>TITLE</a:t>
             </a:r>
-            <a:endParaRPr lang="ru-RU" sz="2800" b="1" strike="noStrike" spc="-1" dirty="0">
+            <a:endParaRPr lang="ru-RU" sz="2200" strike="noStrike" spc="-1" dirty="0">
               <a:solidFill>
                 <a:schemeClr val="bg1"/>
               </a:solidFill>

</xml_diff>